<commit_message>
I have added a late presentation on the topic of transportation problems in operations research. x2
</commit_message>
<xml_diff>
--- a/Operations Research/Transportation model/Transportation-Problems.pptx
+++ b/Operations Research/Transportation model/Transportation-Problems.pptx
@@ -3995,8 +3995,12 @@
               <a:buAutoNum type="arabicPeriod"/>
             </a:pPr>
             <a:r>
+              <a:rPr lang="en-US" sz="3600"/>
+              <a:t>Stepping </a:t>
+            </a:r>
+            <a:r>
               <a:rPr lang="en-US" sz="3600" dirty="0"/>
-              <a:t>String Stone</a:t>
+              <a:t>Stone</a:t>
             </a:r>
           </a:p>
           <a:p>

</xml_diff>